<commit_message>
docs: fix broken link
</commit_message>
<xml_diff>
--- a/docs_notebooks/inverse.pptx
+++ b/docs_notebooks/inverse.pptx
@@ -204,7 +204,7 @@
           <a:p>
             <a:fld id="{07F57EFC-2184-EC43-B4CB-DB882E5E8751}" type="datetimeFigureOut">
               <a:rPr lang="en-US" smtClean="0"/>
-              <a:t>1/1/22</a:t>
+              <a:t>4/26/22</a:t>
             </a:fld>
             <a:endParaRPr lang="en-US"/>
           </a:p>
@@ -1038,7 +1038,7 @@
           <a:p>
             <a:fld id="{952835FF-3B0E-3041-AF8C-3F69E438AA42}" type="datetimeFigureOut">
               <a:rPr lang="en-US" smtClean="0"/>
-              <a:t>1/1/22</a:t>
+              <a:t>4/26/22</a:t>
             </a:fld>
             <a:endParaRPr lang="en-US"/>
           </a:p>
@@ -1236,7 +1236,7 @@
           <a:p>
             <a:fld id="{952835FF-3B0E-3041-AF8C-3F69E438AA42}" type="datetimeFigureOut">
               <a:rPr lang="en-US" smtClean="0"/>
-              <a:t>1/1/22</a:t>
+              <a:t>4/26/22</a:t>
             </a:fld>
             <a:endParaRPr lang="en-US"/>
           </a:p>
@@ -1444,7 +1444,7 @@
           <a:p>
             <a:fld id="{952835FF-3B0E-3041-AF8C-3F69E438AA42}" type="datetimeFigureOut">
               <a:rPr lang="en-US" smtClean="0"/>
-              <a:t>1/1/22</a:t>
+              <a:t>4/26/22</a:t>
             </a:fld>
             <a:endParaRPr lang="en-US"/>
           </a:p>
@@ -1642,7 +1642,7 @@
           <a:p>
             <a:fld id="{952835FF-3B0E-3041-AF8C-3F69E438AA42}" type="datetimeFigureOut">
               <a:rPr lang="en-US" smtClean="0"/>
-              <a:t>1/1/22</a:t>
+              <a:t>4/26/22</a:t>
             </a:fld>
             <a:endParaRPr lang="en-US"/>
           </a:p>
@@ -1917,7 +1917,7 @@
           <a:p>
             <a:fld id="{952835FF-3B0E-3041-AF8C-3F69E438AA42}" type="datetimeFigureOut">
               <a:rPr lang="en-US" smtClean="0"/>
-              <a:t>1/1/22</a:t>
+              <a:t>4/26/22</a:t>
             </a:fld>
             <a:endParaRPr lang="en-US"/>
           </a:p>
@@ -2182,7 +2182,7 @@
           <a:p>
             <a:fld id="{952835FF-3B0E-3041-AF8C-3F69E438AA42}" type="datetimeFigureOut">
               <a:rPr lang="en-US" smtClean="0"/>
-              <a:t>1/1/22</a:t>
+              <a:t>4/26/22</a:t>
             </a:fld>
             <a:endParaRPr lang="en-US"/>
           </a:p>
@@ -2594,7 +2594,7 @@
           <a:p>
             <a:fld id="{952835FF-3B0E-3041-AF8C-3F69E438AA42}" type="datetimeFigureOut">
               <a:rPr lang="en-US" smtClean="0"/>
-              <a:t>1/1/22</a:t>
+              <a:t>4/26/22</a:t>
             </a:fld>
             <a:endParaRPr lang="en-US"/>
           </a:p>
@@ -2735,7 +2735,7 @@
           <a:p>
             <a:fld id="{952835FF-3B0E-3041-AF8C-3F69E438AA42}" type="datetimeFigureOut">
               <a:rPr lang="en-US" smtClean="0"/>
-              <a:t>1/1/22</a:t>
+              <a:t>4/26/22</a:t>
             </a:fld>
             <a:endParaRPr lang="en-US"/>
           </a:p>
@@ -2848,7 +2848,7 @@
           <a:p>
             <a:fld id="{952835FF-3B0E-3041-AF8C-3F69E438AA42}" type="datetimeFigureOut">
               <a:rPr lang="en-US" smtClean="0"/>
-              <a:t>1/1/22</a:t>
+              <a:t>4/26/22</a:t>
             </a:fld>
             <a:endParaRPr lang="en-US"/>
           </a:p>
@@ -3159,7 +3159,7 @@
           <a:p>
             <a:fld id="{952835FF-3B0E-3041-AF8C-3F69E438AA42}" type="datetimeFigureOut">
               <a:rPr lang="en-US" smtClean="0"/>
-              <a:t>1/1/22</a:t>
+              <a:t>4/26/22</a:t>
             </a:fld>
             <a:endParaRPr lang="en-US"/>
           </a:p>
@@ -3447,7 +3447,7 @@
           <a:p>
             <a:fld id="{952835FF-3B0E-3041-AF8C-3F69E438AA42}" type="datetimeFigureOut">
               <a:rPr lang="en-US" smtClean="0"/>
-              <a:t>1/1/22</a:t>
+              <a:t>4/26/22</a:t>
             </a:fld>
             <a:endParaRPr lang="en-US"/>
           </a:p>
@@ -3688,7 +3688,7 @@
           <a:p>
             <a:fld id="{952835FF-3B0E-3041-AF8C-3F69E438AA42}" type="datetimeFigureOut">
               <a:rPr lang="en-US" smtClean="0"/>
-              <a:t>1/1/22</a:t>
+              <a:t>4/26/22</a:t>
             </a:fld>
             <a:endParaRPr lang="en-US"/>
           </a:p>
@@ -4191,10 +4191,10 @@
           </p:nvGrpSpPr>
           <p:grpSpPr>
             <a:xfrm>
-              <a:off x="757251" y="490889"/>
-              <a:ext cx="6745933" cy="2337081"/>
-              <a:chOff x="757251" y="490889"/>
-              <a:chExt cx="6745933" cy="2337081"/>
+              <a:off x="757251" y="383558"/>
+              <a:ext cx="6584030" cy="2444412"/>
+              <a:chOff x="757251" y="383558"/>
+              <a:chExt cx="6584030" cy="2444412"/>
             </a:xfrm>
           </p:grpSpPr>
           <p:sp>
@@ -5602,8 +5602,8 @@
             </p:nvSpPr>
             <p:spPr>
               <a:xfrm>
-                <a:off x="2352203" y="490889"/>
-                <a:ext cx="1045479" cy="261610"/>
+                <a:off x="2542159" y="383558"/>
+                <a:ext cx="665567" cy="430887"/>
               </a:xfrm>
               <a:prstGeom prst="rect">
                 <a:avLst/>
@@ -5619,7 +5619,14 @@
                 <a:pPr algn="ctr"/>
                 <a:r>
                   <a:rPr lang="en-US" sz="1100" noProof="1"/>
-                  <a:t>assign to i-quib</a:t>
+                  <a:t>Assign</a:t>
+                </a:r>
+              </a:p>
+              <a:p>
+                <a:pPr algn="ctr"/>
+                <a:r>
+                  <a:rPr lang="en-US" sz="1100" noProof="1"/>
+                  <a:t>to i-quib</a:t>
                 </a:r>
               </a:p>
             </p:txBody>
@@ -5638,8 +5645,8 @@
             </p:nvSpPr>
             <p:spPr>
               <a:xfrm>
-                <a:off x="3355219" y="490889"/>
-                <a:ext cx="1093569" cy="261610"/>
+                <a:off x="3517122" y="383558"/>
+                <a:ext cx="769763" cy="430887"/>
               </a:xfrm>
               <a:prstGeom prst="rect">
                 <a:avLst/>
@@ -5655,7 +5662,14 @@
                 <a:pPr algn="ctr"/>
                 <a:r>
                   <a:rPr lang="en-US" sz="1100" dirty="0"/>
-                  <a:t>open dialog box</a:t>
+                  <a:t>Open</a:t>
+                </a:r>
+              </a:p>
+              <a:p>
+                <a:pPr algn="ctr"/>
+                <a:r>
+                  <a:rPr lang="en-US" sz="1100" dirty="0"/>
+                  <a:t>dialog box</a:t>
                 </a:r>
               </a:p>
             </p:txBody>
@@ -6118,8 +6132,8 @@
             </p:nvSpPr>
             <p:spPr>
               <a:xfrm>
-                <a:off x="4436951" y="490889"/>
-                <a:ext cx="1045479" cy="261610"/>
+                <a:off x="4626907" y="383558"/>
+                <a:ext cx="665567" cy="430887"/>
               </a:xfrm>
               <a:prstGeom prst="rect">
                 <a:avLst/>
@@ -6134,8 +6148,23 @@
               <a:p>
                 <a:pPr algn="ctr"/>
                 <a:r>
-                  <a:rPr lang="en-US" sz="1100"/>
-                  <a:t>assign to i-quib</a:t>
+                  <a:rPr lang="en-US" sz="1100" dirty="0"/>
+                  <a:t>Assign</a:t>
+                </a:r>
+              </a:p>
+              <a:p>
+                <a:pPr algn="ctr"/>
+                <a:r>
+                  <a:rPr lang="en-US" sz="1100" dirty="0"/>
+                  <a:t>to </a:t>
+                </a:r>
+                <a:r>
+                  <a:rPr lang="en-US" sz="1100" dirty="0" err="1"/>
+                  <a:t>i</a:t>
+                </a:r>
+                <a:r>
+                  <a:rPr lang="en-US" sz="1100" dirty="0"/>
+                  <a:t>-quib</a:t>
                 </a:r>
               </a:p>
             </p:txBody>
@@ -6556,8 +6585,8 @@
             </p:nvSpPr>
             <p:spPr>
               <a:xfrm>
-                <a:off x="5522907" y="490889"/>
-                <a:ext cx="917238" cy="261610"/>
+                <a:off x="5708053" y="383558"/>
+                <a:ext cx="546946" cy="430887"/>
               </a:xfrm>
               <a:prstGeom prst="rect">
                 <a:avLst/>
@@ -6573,7 +6602,14 @@
                 <a:pPr algn="ctr"/>
                 <a:r>
                   <a:rPr lang="en-US" sz="1100" noProof="1"/>
-                  <a:t>assign to self</a:t>
+                  <a:t>Assign</a:t>
+                </a:r>
+              </a:p>
+              <a:p>
+                <a:pPr algn="ctr"/>
+                <a:r>
+                  <a:rPr lang="en-US" sz="1100" noProof="1"/>
+                  <a:t>to self</a:t>
                 </a:r>
               </a:p>
             </p:txBody>
@@ -8221,8 +8257,8 @@
             </p:nvSpPr>
             <p:spPr>
               <a:xfrm>
-                <a:off x="6409615" y="490889"/>
-                <a:ext cx="1093569" cy="261610"/>
+                <a:off x="6571518" y="383558"/>
+                <a:ext cx="769763" cy="430887"/>
               </a:xfrm>
               <a:prstGeom prst="rect">
                 <a:avLst/>
@@ -8238,7 +8274,14 @@
                 <a:pPr algn="ctr"/>
                 <a:r>
                   <a:rPr lang="en-US" sz="1100" dirty="0"/>
-                  <a:t>open dialog box</a:t>
+                  <a:t>Open</a:t>
+                </a:r>
+              </a:p>
+              <a:p>
+                <a:pPr algn="ctr"/>
+                <a:r>
+                  <a:rPr lang="en-US" sz="1100" dirty="0"/>
+                  <a:t>dialog box</a:t>
                 </a:r>
               </a:p>
             </p:txBody>

</xml_diff>